<commit_message>
fiexed typo in list slides
</commit_message>
<xml_diff>
--- a/Python Day 6 Strings and Lists.pptx
+++ b/Python Day 6 Strings and Lists.pptx
@@ -33133,8 +33133,12 @@
               <a:t>	</a:t>
             </a:r>
             <a:r>
+              <a:rPr lang="en-US" sz="8000" dirty="0"/>
+              <a:t> animal</a:t>
+            </a:r>
+            <a:r>
               <a:rPr lang="en-US" sz="7400" dirty="0"/>
-              <a:t>giraffe[0] = ‘g’</a:t>
+              <a:t>[0] = ‘g’</a:t>
             </a:r>
           </a:p>
           <a:p>
@@ -33143,7 +33147,15 @@
             </a:pPr>
             <a:r>
               <a:rPr lang="en-US" sz="7400" dirty="0"/>
-              <a:t>	giraffe[1] = ‘</a:t>
+              <a:t>	</a:t>
+            </a:r>
+            <a:r>
+              <a:rPr lang="en-US" sz="8000" dirty="0"/>
+              <a:t> animal</a:t>
+            </a:r>
+            <a:r>
+              <a:rPr lang="en-US" sz="7400" dirty="0"/>
+              <a:t>[1] = ‘</a:t>
             </a:r>
             <a:r>
               <a:rPr lang="en-US" sz="7400" dirty="0" err="1"/>
@@ -33160,7 +33172,15 @@
             </a:pPr>
             <a:r>
               <a:rPr lang="en-US" sz="7400" dirty="0"/>
-              <a:t>	giraffe[2] = ‘r’</a:t>
+              <a:t>	</a:t>
+            </a:r>
+            <a:r>
+              <a:rPr lang="en-US" sz="8000" dirty="0"/>
+              <a:t> animal</a:t>
+            </a:r>
+            <a:r>
+              <a:rPr lang="en-US" sz="7400" dirty="0"/>
+              <a:t>[2] = ‘r’</a:t>
             </a:r>
           </a:p>
           <a:p>
@@ -33169,7 +33189,15 @@
             </a:pPr>
             <a:r>
               <a:rPr lang="en-US" sz="7400" dirty="0"/>
-              <a:t>	giraffe[3] = ‘a’</a:t>
+              <a:t>	</a:t>
+            </a:r>
+            <a:r>
+              <a:rPr lang="en-US" sz="8000" dirty="0"/>
+              <a:t> animal</a:t>
+            </a:r>
+            <a:r>
+              <a:rPr lang="en-US" sz="7400" dirty="0"/>
+              <a:t>[3] = ‘a’</a:t>
             </a:r>
           </a:p>
           <a:p>
@@ -33178,7 +33206,15 @@
             </a:pPr>
             <a:r>
               <a:rPr lang="en-US" sz="7400" dirty="0"/>
-              <a:t>	giraffe[4] = ‘f’</a:t>
+              <a:t>	</a:t>
+            </a:r>
+            <a:r>
+              <a:rPr lang="en-US" sz="8000" dirty="0"/>
+              <a:t> animal</a:t>
+            </a:r>
+            <a:r>
+              <a:rPr lang="en-US" sz="7400" dirty="0"/>
+              <a:t>[4] = ‘f’</a:t>
             </a:r>
           </a:p>
           <a:p>
@@ -33187,7 +33223,15 @@
             </a:pPr>
             <a:r>
               <a:rPr lang="en-US" sz="7400" dirty="0"/>
-              <a:t>	giraffe[5] = ‘f’</a:t>
+              <a:t>	</a:t>
+            </a:r>
+            <a:r>
+              <a:rPr lang="en-US" sz="8000" dirty="0"/>
+              <a:t> animal</a:t>
+            </a:r>
+            <a:r>
+              <a:rPr lang="en-US" sz="7400" dirty="0"/>
+              <a:t>[5] = ‘f’</a:t>
             </a:r>
           </a:p>
           <a:p>
@@ -33196,7 +33240,15 @@
             </a:pPr>
             <a:r>
               <a:rPr lang="en-US" sz="7400" dirty="0"/>
-              <a:t>	giraffe[6] = ‘e’</a:t>
+              <a:t>	</a:t>
+            </a:r>
+            <a:r>
+              <a:rPr lang="en-US" sz="8000" dirty="0"/>
+              <a:t> animal</a:t>
+            </a:r>
+            <a:r>
+              <a:rPr lang="en-US" sz="7400" dirty="0"/>
+              <a:t>[6] = ‘e’</a:t>
             </a:r>
             <a:r>
               <a:rPr lang="en-US" dirty="0"/>

</xml_diff>